<commit_message>
Some small architecture modifications.
</commit_message>
<xml_diff>
--- a/architecture/architecture.pptx
+++ b/architecture/architecture.pptx
@@ -104,6 +104,11 @@
       </a:defRPr>
     </a:lvl9pPr>
   </p:defaultTextStyle>
+  <p:extLst>
+    <p:ext uri="{EFAFB233-063F-42B5-8137-9DF3F51BA10A}">
+      <p15:sldGuideLst xmlns:p15="http://schemas.microsoft.com/office/powerpoint/2012/main"/>
+    </p:ext>
+  </p:extLst>
 </p:presentation>
 </file>
 
@@ -3606,7 +3611,7 @@
         </p:nvSpPr>
         <p:spPr>
           <a:xfrm>
-            <a:off x="4862002" y="1294400"/>
+            <a:off x="5248186" y="1316491"/>
             <a:ext cx="1481092" cy="665825"/>
           </a:xfrm>
           <a:prstGeom prst="rect">
@@ -3892,13 +3897,15 @@
               </a:ext>
             </a:extLst>
           </p:cNvPr>
-          <p:cNvCxnSpPr/>
+          <p:cNvCxnSpPr>
+            <a:cxnSpLocks/>
+          </p:cNvCxnSpPr>
           <p:nvPr/>
         </p:nvCxnSpPr>
         <p:spPr>
           <a:xfrm>
             <a:off x="4107400" y="1642770"/>
-            <a:ext cx="754602" cy="0"/>
+            <a:ext cx="1140786" cy="0"/>
           </a:xfrm>
           <a:prstGeom prst="straightConnector1">
             <a:avLst/>
@@ -3939,8 +3946,8 @@
         </p:nvCxnSpPr>
         <p:spPr>
           <a:xfrm flipV="1">
-            <a:off x="6343094" y="516368"/>
-            <a:ext cx="2211281" cy="1110945"/>
+            <a:off x="6729278" y="516368"/>
+            <a:ext cx="1825097" cy="1133036"/>
           </a:xfrm>
           <a:prstGeom prst="bentConnector3">
             <a:avLst/>
@@ -3981,8 +3988,8 @@
         </p:nvCxnSpPr>
         <p:spPr>
           <a:xfrm>
-            <a:off x="6343094" y="1627313"/>
-            <a:ext cx="2211281" cy="1340952"/>
+            <a:off x="6729278" y="1649404"/>
+            <a:ext cx="1825097" cy="1318861"/>
           </a:xfrm>
           <a:prstGeom prst="bentConnector3">
             <a:avLst/>
@@ -4023,8 +4030,8 @@
         </p:nvCxnSpPr>
         <p:spPr>
           <a:xfrm flipV="1">
-            <a:off x="6343094" y="1284734"/>
-            <a:ext cx="2211281" cy="342579"/>
+            <a:off x="6729278" y="1284734"/>
+            <a:ext cx="1825097" cy="364670"/>
           </a:xfrm>
           <a:prstGeom prst="bentConnector3">
             <a:avLst/>
@@ -4066,8 +4073,8 @@
         </p:nvCxnSpPr>
         <p:spPr>
           <a:xfrm>
-            <a:off x="6343094" y="1627313"/>
-            <a:ext cx="2211281" cy="510697"/>
+            <a:off x="6729278" y="1649404"/>
+            <a:ext cx="1825097" cy="488606"/>
           </a:xfrm>
           <a:prstGeom prst="bentConnector3">
             <a:avLst/>
@@ -4223,8 +4230,8 @@
         </p:nvSpPr>
         <p:spPr>
           <a:xfrm>
-            <a:off x="4084468" y="1247500"/>
-            <a:ext cx="852256" cy="369332"/>
+            <a:off x="4059300" y="1247500"/>
+            <a:ext cx="1313896" cy="369332"/>
           </a:xfrm>
           <a:prstGeom prst="rect">
             <a:avLst/>
@@ -4239,7 +4246,7 @@
           <a:p>
             <a:r>
               <a:rPr lang="en-US" dirty="0"/>
-              <a:t>Model</a:t>
+              <a:t>Best model</a:t>
             </a:r>
             <a:endParaRPr lang="de-CH" dirty="0"/>
           </a:p>
@@ -4259,7 +4266,7 @@
         </p:nvSpPr>
         <p:spPr>
           <a:xfrm>
-            <a:off x="6357144" y="1247500"/>
+            <a:off x="6660841" y="1240032"/>
             <a:ext cx="1145223" cy="369332"/>
           </a:xfrm>
           <a:prstGeom prst="rect">
@@ -4672,45 +4679,6 @@
           </a:p>
         </p:txBody>
       </p:sp>
-      <p:cxnSp>
-        <p:nvCxnSpPr>
-          <p:cNvPr id="61" name="Straight Arrow Connector 60">
-            <a:extLst>
-              <a:ext uri="{FF2B5EF4-FFF2-40B4-BE49-F238E27FC236}">
-                <a16:creationId xmlns:a16="http://schemas.microsoft.com/office/drawing/2014/main" id="{B3EC2192-952C-4913-ACB7-70E1A2764A23}"/>
-              </a:ext>
-            </a:extLst>
-          </p:cNvPr>
-          <p:cNvCxnSpPr/>
-          <p:nvPr/>
-        </p:nvCxnSpPr>
-        <p:spPr>
-          <a:xfrm>
-            <a:off x="1948653" y="5229619"/>
-            <a:ext cx="754602" cy="0"/>
-          </a:xfrm>
-          <a:prstGeom prst="straightConnector1">
-            <a:avLst/>
-          </a:prstGeom>
-          <a:ln w="38100">
-            <a:tailEnd type="triangle"/>
-          </a:ln>
-        </p:spPr>
-        <p:style>
-          <a:lnRef idx="1">
-            <a:schemeClr val="accent1"/>
-          </a:lnRef>
-          <a:fillRef idx="0">
-            <a:schemeClr val="accent1"/>
-          </a:fillRef>
-          <a:effectRef idx="0">
-            <a:schemeClr val="accent1"/>
-          </a:effectRef>
-          <a:fontRef idx="minor">
-            <a:schemeClr val="tx1"/>
-          </a:fontRef>
-        </p:style>
-      </p:cxnSp>
       <p:sp>
         <p:nvSpPr>
           <p:cNvPr id="62" name="TextBox 61">
@@ -4861,7 +4829,7 @@
         </p:nvSpPr>
         <p:spPr>
           <a:xfrm>
-            <a:off x="9848850" y="5151042"/>
+            <a:off x="9983198" y="5132153"/>
             <a:ext cx="1020932" cy="499214"/>
           </a:xfrm>
           <a:prstGeom prst="rect">
@@ -4955,8 +4923,8 @@
         </p:nvCxnSpPr>
         <p:spPr>
           <a:xfrm>
-            <a:off x="4054735" y="4984847"/>
-            <a:ext cx="3781147" cy="436581"/>
+            <a:off x="4089769" y="4976521"/>
+            <a:ext cx="3707906" cy="444907"/>
           </a:xfrm>
           <a:prstGeom prst="bentConnector3">
             <a:avLst/>
@@ -5036,9 +5004,9 @@
           <p:nvPr/>
         </p:nvCxnSpPr>
         <p:spPr>
-          <a:xfrm>
-            <a:off x="8808033" y="4505460"/>
-            <a:ext cx="1040817" cy="0"/>
+          <a:xfrm flipV="1">
+            <a:off x="8808033" y="4504887"/>
+            <a:ext cx="1145223" cy="573"/>
           </a:xfrm>
           <a:prstGeom prst="straightConnector1">
             <a:avLst/>
@@ -5076,8 +5044,8 @@
         </p:nvSpPr>
         <p:spPr>
           <a:xfrm>
-            <a:off x="8921276" y="4184676"/>
-            <a:ext cx="852256" cy="369332"/>
+            <a:off x="8756865" y="4125634"/>
+            <a:ext cx="1299145" cy="369332"/>
           </a:xfrm>
           <a:prstGeom prst="rect">
             <a:avLst/>
@@ -5092,7 +5060,7 @@
           <a:p>
             <a:r>
               <a:rPr lang="en-US" dirty="0"/>
-              <a:t>Model</a:t>
+              <a:t>Best model</a:t>
             </a:r>
             <a:endParaRPr lang="de-CH" dirty="0"/>
           </a:p>
@@ -5149,9 +5117,9 @@
           <p:nvPr/>
         </p:nvCxnSpPr>
         <p:spPr>
-          <a:xfrm>
-            <a:off x="8826996" y="5404777"/>
-            <a:ext cx="1040817" cy="0"/>
+          <a:xfrm flipV="1">
+            <a:off x="8826996" y="5400649"/>
+            <a:ext cx="1196263" cy="4128"/>
           </a:xfrm>
           <a:prstGeom prst="straightConnector1">
             <a:avLst/>
@@ -5191,7 +5159,7 @@
         </p:nvCxnSpPr>
         <p:spPr>
           <a:xfrm>
-            <a:off x="10855908" y="5381760"/>
+            <a:off x="11004130" y="5377788"/>
             <a:ext cx="1040817" cy="0"/>
           </a:xfrm>
           <a:prstGeom prst="straightConnector1">
@@ -5230,8 +5198,8 @@
         </p:nvSpPr>
         <p:spPr>
           <a:xfrm>
-            <a:off x="10969151" y="5060976"/>
-            <a:ext cx="852256" cy="369332"/>
+            <a:off x="10964107" y="5073201"/>
+            <a:ext cx="1262437" cy="369332"/>
           </a:xfrm>
           <a:prstGeom prst="rect">
             <a:avLst/>
@@ -5246,12 +5214,51 @@
           <a:p>
             <a:r>
               <a:rPr lang="en-US" dirty="0"/>
-              <a:t>Model</a:t>
+              <a:t>Best model</a:t>
             </a:r>
             <a:endParaRPr lang="de-CH" dirty="0"/>
           </a:p>
         </p:txBody>
       </p:sp>
+      <p:cxnSp>
+        <p:nvCxnSpPr>
+          <p:cNvPr id="63" name="Straight Arrow Connector 62">
+            <a:extLst>
+              <a:ext uri="{FF2B5EF4-FFF2-40B4-BE49-F238E27FC236}">
+                <a16:creationId xmlns:a16="http://schemas.microsoft.com/office/drawing/2014/main" id="{8CB07B16-63BA-4ACC-9724-E4C87AF115DE}"/>
+              </a:ext>
+            </a:extLst>
+          </p:cNvPr>
+          <p:cNvCxnSpPr/>
+          <p:nvPr/>
+        </p:nvCxnSpPr>
+        <p:spPr>
+          <a:xfrm>
+            <a:off x="1954327" y="5181593"/>
+            <a:ext cx="754602" cy="0"/>
+          </a:xfrm>
+          <a:prstGeom prst="straightConnector1">
+            <a:avLst/>
+          </a:prstGeom>
+          <a:ln w="38100">
+            <a:tailEnd type="triangle"/>
+          </a:ln>
+        </p:spPr>
+        <p:style>
+          <a:lnRef idx="1">
+            <a:schemeClr val="accent1"/>
+          </a:lnRef>
+          <a:fillRef idx="0">
+            <a:schemeClr val="accent1"/>
+          </a:fillRef>
+          <a:effectRef idx="0">
+            <a:schemeClr val="accent1"/>
+          </a:effectRef>
+          <a:fontRef idx="minor">
+            <a:schemeClr val="tx1"/>
+          </a:fontRef>
+        </p:style>
+      </p:cxnSp>
     </p:spTree>
     <p:extLst>
       <p:ext uri="{BB962C8B-B14F-4D97-AF65-F5344CB8AC3E}">

</xml_diff>